<commit_message>
NID ajuste ... 01122023
</commit_message>
<xml_diff>
--- a/09 seminário NID/PPT Seminário NID Yduqs Wyden UniRuy 2023_2 - Julia Cardoso.pptx
+++ b/09 seminário NID/PPT Seminário NID Yduqs Wyden UniRuy 2023_2 - Julia Cardoso.pptx
@@ -3958,7 +3958,7 @@
           </a:ln>
           <a:extLst>
             <a:ext uri="{C572A759-6A51-4108-AA02-DFA0A04FC94B}">
-              <ma14:wrappingTextBoxFlag xmlns="" xmlns:ma14="http://schemas.microsoft.com/office/mac/drawingml/2011/main" val="1"/>
+              <ma14:wrappingTextBoxFlag xmlns:ma14="http://schemas.microsoft.com/office/mac/drawingml/2011/main" xmlns="" val="1"/>
             </a:ext>
           </a:extLst>
         </p:spPr>
@@ -4007,7 +4007,7 @@
           </a:ln>
           <a:extLst>
             <a:ext uri="{C572A759-6A51-4108-AA02-DFA0A04FC94B}">
-              <ma14:wrappingTextBoxFlag xmlns="" xmlns:ma14="http://schemas.microsoft.com/office/mac/drawingml/2011/main" val="1"/>
+              <ma14:wrappingTextBoxFlag xmlns:ma14="http://schemas.microsoft.com/office/mac/drawingml/2011/main" xmlns="" val="1"/>
             </a:ext>
           </a:extLst>
         </p:spPr>
@@ -4978,7 +4978,7 @@
           </a:ln>
           <a:extLst>
             <a:ext uri="{C572A759-6A51-4108-AA02-DFA0A04FC94B}">
-              <ma14:wrappingTextBoxFlag xmlns="" xmlns:ma14="http://schemas.microsoft.com/office/mac/drawingml/2011/main" val="1"/>
+              <ma14:wrappingTextBoxFlag xmlns:ma14="http://schemas.microsoft.com/office/mac/drawingml/2011/main" xmlns="" val="1"/>
             </a:ext>
           </a:extLst>
         </p:spPr>
@@ -5344,7 +5344,7 @@
           </a:ln>
           <a:extLst>
             <a:ext uri="{C572A759-6A51-4108-AA02-DFA0A04FC94B}">
-              <ma14:wrappingTextBoxFlag xmlns="" xmlns:ma14="http://schemas.microsoft.com/office/mac/drawingml/2011/main" val="1"/>
+              <ma14:wrappingTextBoxFlag xmlns:ma14="http://schemas.microsoft.com/office/mac/drawingml/2011/main" xmlns="" val="1"/>
             </a:ext>
           </a:extLst>
         </p:spPr>
@@ -5629,8 +5629,21 @@
                   <a:schemeClr val="bg1"/>
                 </a:solidFill>
               </a:rPr>
-              <a:t>Palestrante(s): Josiane Sheila e Júlia Cardoso</a:t>
-            </a:r>
+              <a:t>Palestrante(s</a:t>
+            </a:r>
+            <a:r>
+              <a:rPr lang="pt-BR" sz="2800" b="1">
+                <a:solidFill>
+                  <a:schemeClr val="bg1"/>
+                </a:solidFill>
+              </a:rPr>
+              <a:t>): Júlia Cardoso e Josiane Sheila</a:t>
+            </a:r>
+            <a:endParaRPr lang="pt-BR" sz="2800" b="1" dirty="0">
+              <a:solidFill>
+                <a:schemeClr val="bg1"/>
+              </a:solidFill>
+            </a:endParaRPr>
           </a:p>
         </p:txBody>
       </p:sp>
@@ -5697,7 +5710,7 @@
           </a:ln>
           <a:extLst>
             <a:ext uri="{C572A759-6A51-4108-AA02-DFA0A04FC94B}">
-              <ma14:wrappingTextBoxFlag xmlns="" xmlns:ma14="http://schemas.microsoft.com/office/mac/drawingml/2011/main" val="1"/>
+              <ma14:wrappingTextBoxFlag xmlns:ma14="http://schemas.microsoft.com/office/mac/drawingml/2011/main" xmlns="" val="1"/>
             </a:ext>
           </a:extLst>
         </p:spPr>
@@ -8083,7 +8096,7 @@
           </a:ln>
           <a:extLst>
             <a:ext uri="{C572A759-6A51-4108-AA02-DFA0A04FC94B}">
-              <ma14:wrappingTextBoxFlag xmlns="" xmlns:ma14="http://schemas.microsoft.com/office/mac/drawingml/2011/main" val="1"/>
+              <ma14:wrappingTextBoxFlag xmlns:ma14="http://schemas.microsoft.com/office/mac/drawingml/2011/main" xmlns="" val="1"/>
             </a:ext>
           </a:extLst>
         </p:spPr>
@@ -10661,18 +10674,18 @@
 </file>
 
 <file path=customXml/item1.xml><?xml version="1.0" encoding="utf-8"?>
+<p:properties xmlns:p="http://schemas.microsoft.com/office/2006/metadata/properties" xmlns:xsi="http://www.w3.org/2001/XMLSchema-instance" xmlns:pc="http://schemas.microsoft.com/office/infopath/2007/PartnerControls">
+  <documentManagement/>
+</p:properties>
+</file>
+
+<file path=customXml/item2.xml><?xml version="1.0" encoding="utf-8"?>
 <?mso-contentType ?>
 <FormTemplates xmlns="http://schemas.microsoft.com/sharepoint/v3/contenttype/forms">
   <Display>DocumentLibraryForm</Display>
   <Edit>DocumentLibraryForm</Edit>
   <New>DocumentLibraryForm</New>
 </FormTemplates>
-</file>
-
-<file path=customXml/item2.xml><?xml version="1.0" encoding="utf-8"?>
-<p:properties xmlns:p="http://schemas.microsoft.com/office/2006/metadata/properties" xmlns:xsi="http://www.w3.org/2001/XMLSchema-instance" xmlns:pc="http://schemas.microsoft.com/office/infopath/2007/PartnerControls">
-  <documentManagement/>
-</p:properties>
 </file>
 
 <file path=customXml/item3.xml><?xml version="1.0" encoding="utf-8"?>
@@ -10899,18 +10912,18 @@
 </file>
 
 <file path=customXml/itemProps1.xml><?xml version="1.0" encoding="utf-8"?>
-<ds:datastoreItem xmlns:ds="http://schemas.openxmlformats.org/officeDocument/2006/customXml" ds:itemID="{AED456AD-07D2-43E3-AD57-2C9049066662}">
+<ds:datastoreItem xmlns:ds="http://schemas.openxmlformats.org/officeDocument/2006/customXml" ds:itemID="{961A30F4-F1EA-4F98-A164-76D337EE5565}">
   <ds:schemaRefs>
-    <ds:schemaRef ds:uri="http://schemas.microsoft.com/sharepoint/v3/contenttype/forms"/>
+    <ds:schemaRef ds:uri="http://schemas.microsoft.com/office/2006/metadata/properties"/>
+    <ds:schemaRef ds:uri="http://schemas.microsoft.com/office/infopath/2007/PartnerControls"/>
   </ds:schemaRefs>
 </ds:datastoreItem>
 </file>
 
 <file path=customXml/itemProps2.xml><?xml version="1.0" encoding="utf-8"?>
-<ds:datastoreItem xmlns:ds="http://schemas.openxmlformats.org/officeDocument/2006/customXml" ds:itemID="{961A30F4-F1EA-4F98-A164-76D337EE5565}">
+<ds:datastoreItem xmlns:ds="http://schemas.openxmlformats.org/officeDocument/2006/customXml" ds:itemID="{AED456AD-07D2-43E3-AD57-2C9049066662}">
   <ds:schemaRefs>
-    <ds:schemaRef ds:uri="http://schemas.microsoft.com/office/2006/metadata/properties"/>
-    <ds:schemaRef ds:uri="http://schemas.microsoft.com/office/infopath/2007/PartnerControls"/>
+    <ds:schemaRef ds:uri="http://schemas.microsoft.com/sharepoint/v3/contenttype/forms"/>
   </ds:schemaRefs>
 </ds:datastoreItem>
 </file>

</xml_diff>